<commit_message>
update latex; update selection
</commit_message>
<xml_diff>
--- a/Docs/Presentation.pptx
+++ b/Docs/Presentation.pptx
@@ -5,10 +5,10 @@
     <p:sldMasterId id="2147483673" r:id="rId1"/>
   </p:sldMasterIdLst>
   <p:notesMasterIdLst>
-    <p:notesMasterId r:id="rId28"/>
+    <p:notesMasterId r:id="rId27"/>
   </p:notesMasterIdLst>
   <p:handoutMasterIdLst>
-    <p:handoutMasterId r:id="rId29"/>
+    <p:handoutMasterId r:id="rId28"/>
   </p:handoutMasterIdLst>
   <p:sldIdLst>
     <p:sldId id="298" r:id="rId2"/>
@@ -27,16 +27,15 @@
     <p:sldId id="311" r:id="rId15"/>
     <p:sldId id="320" r:id="rId16"/>
     <p:sldId id="321" r:id="rId17"/>
-    <p:sldId id="329" r:id="rId18"/>
-    <p:sldId id="326" r:id="rId19"/>
-    <p:sldId id="313" r:id="rId20"/>
-    <p:sldId id="322" r:id="rId21"/>
-    <p:sldId id="319" r:id="rId22"/>
-    <p:sldId id="328" r:id="rId23"/>
-    <p:sldId id="327" r:id="rId24"/>
-    <p:sldId id="300" r:id="rId25"/>
-    <p:sldId id="312" r:id="rId26"/>
-    <p:sldId id="303" r:id="rId27"/>
+    <p:sldId id="326" r:id="rId18"/>
+    <p:sldId id="313" r:id="rId19"/>
+    <p:sldId id="322" r:id="rId20"/>
+    <p:sldId id="319" r:id="rId21"/>
+    <p:sldId id="328" r:id="rId22"/>
+    <p:sldId id="327" r:id="rId23"/>
+    <p:sldId id="300" r:id="rId24"/>
+    <p:sldId id="312" r:id="rId25"/>
+    <p:sldId id="303" r:id="rId26"/>
   </p:sldIdLst>
   <p:sldSz cx="9144000" cy="5143500" type="screen16x9"/>
   <p:notesSz cx="6858000" cy="9144000"/>
@@ -290,7 +289,6 @@
             <p14:sldId id="311"/>
             <p14:sldId id="320"/>
             <p14:sldId id="321"/>
-            <p14:sldId id="329"/>
             <p14:sldId id="326"/>
             <p14:sldId id="313"/>
             <p14:sldId id="322"/>
@@ -7647,7 +7645,7 @@
           <a:p>
             <a:fld id="{28AE051E-4971-4F36-901C-869D0DCBC810}" type="datetimeFigureOut">
               <a:rPr lang="pt-PT" smtClean="0"/>
-              <a:t>16/06/2025</a:t>
+              <a:t>21/06/2025</a:t>
             </a:fld>
             <a:endParaRPr lang="pt-PT"/>
           </a:p>
@@ -13609,10 +13607,10 @@
       </p:sp>
       <p:pic>
         <p:nvPicPr>
-          <p:cNvPr id="19" name="Picture 18">
+          <p:cNvPr id="13" name="Picture 12">
             <a:extLst>
               <a:ext uri="{FF2B5EF4-FFF2-40B4-BE49-F238E27FC236}">
-                <a16:creationId xmlns:a16="http://schemas.microsoft.com/office/drawing/2014/main" id="{592A1512-B678-93D1-7E22-6016AABDE64F}"/>
+                <a16:creationId xmlns:a16="http://schemas.microsoft.com/office/drawing/2014/main" id="{05E08D21-76BC-254C-2A47-F05EF3F1DFEB}"/>
               </a:ext>
             </a:extLst>
           </p:cNvPr>
@@ -13629,8 +13627,8 @@
         </p:blipFill>
         <p:spPr>
           <a:xfrm>
-            <a:off x="720000" y="1357989"/>
-            <a:ext cx="4387817" cy="3284735"/>
+            <a:off x="851454" y="1109499"/>
+            <a:ext cx="4063448" cy="3045207"/>
           </a:xfrm>
           <a:prstGeom prst="rect">
             <a:avLst/>
@@ -13639,10 +13637,10 @@
       </p:pic>
       <p:pic>
         <p:nvPicPr>
-          <p:cNvPr id="21" name="Picture 20">
+          <p:cNvPr id="15" name="Picture 14">
             <a:extLst>
               <a:ext uri="{FF2B5EF4-FFF2-40B4-BE49-F238E27FC236}">
-                <a16:creationId xmlns:a16="http://schemas.microsoft.com/office/drawing/2014/main" id="{2377E01A-6A40-95B6-AEDD-52019C3E4F60}"/>
+                <a16:creationId xmlns:a16="http://schemas.microsoft.com/office/drawing/2014/main" id="{CDC10FAE-9C0B-74F8-63F5-40A943C10A55}"/>
               </a:ext>
             </a:extLst>
           </p:cNvPr>
@@ -13659,8 +13657,8 @@
         </p:blipFill>
         <p:spPr>
           <a:xfrm>
-            <a:off x="703319" y="1799180"/>
-            <a:ext cx="4421177" cy="2128531"/>
+            <a:off x="851454" y="4131846"/>
+            <a:ext cx="4063448" cy="981486"/>
           </a:xfrm>
           <a:prstGeom prst="rect">
             <a:avLst/>
@@ -13685,108 +13683,6 @@
       <p:transition/>
     </mc:Fallback>
   </mc:AlternateContent>
-  <p:timing>
-    <p:tnLst>
-      <p:par>
-        <p:cTn id="1" dur="indefinite" restart="never" nodeType="tmRoot">
-          <p:childTnLst>
-            <p:seq concurrent="1" nextAc="seek">
-              <p:cTn id="2" dur="indefinite" nodeType="mainSeq">
-                <p:childTnLst>
-                  <p:par>
-                    <p:cTn id="3" fill="hold">
-                      <p:stCondLst>
-                        <p:cond delay="indefinite"/>
-                      </p:stCondLst>
-                      <p:childTnLst>
-                        <p:par>
-                          <p:cTn id="4" fill="hold">
-                            <p:stCondLst>
-                              <p:cond delay="0"/>
-                            </p:stCondLst>
-                            <p:childTnLst>
-                              <p:par>
-                                <p:cTn id="5" presetID="1" presetClass="entr" presetSubtype="0" fill="hold" nodeType="clickEffect">
-                                  <p:stCondLst>
-                                    <p:cond delay="0"/>
-                                  </p:stCondLst>
-                                  <p:childTnLst>
-                                    <p:set>
-                                      <p:cBhvr>
-                                        <p:cTn id="6" dur="1" fill="hold">
-                                          <p:stCondLst>
-                                            <p:cond delay="0"/>
-                                          </p:stCondLst>
-                                        </p:cTn>
-                                        <p:tgtEl>
-                                          <p:spTgt spid="21"/>
-                                        </p:tgtEl>
-                                        <p:attrNameLst>
-                                          <p:attrName>style.visibility</p:attrName>
-                                        </p:attrNameLst>
-                                      </p:cBhvr>
-                                      <p:to>
-                                        <p:strVal val="visible"/>
-                                      </p:to>
-                                    </p:set>
-                                  </p:childTnLst>
-                                </p:cTn>
-                              </p:par>
-                              <p:par>
-                                <p:cTn id="7" presetID="1" presetClass="exit" presetSubtype="0" fill="hold" nodeType="withEffect">
-                                  <p:stCondLst>
-                                    <p:cond delay="0"/>
-                                  </p:stCondLst>
-                                  <p:childTnLst>
-                                    <p:set>
-                                      <p:cBhvr>
-                                        <p:cTn id="8" dur="1" fill="hold">
-                                          <p:stCondLst>
-                                            <p:cond delay="0"/>
-                                          </p:stCondLst>
-                                        </p:cTn>
-                                        <p:tgtEl>
-                                          <p:spTgt spid="19"/>
-                                        </p:tgtEl>
-                                        <p:attrNameLst>
-                                          <p:attrName>style.visibility</p:attrName>
-                                        </p:attrNameLst>
-                                      </p:cBhvr>
-                                      <p:to>
-                                        <p:strVal val="hidden"/>
-                                      </p:to>
-                                    </p:set>
-                                  </p:childTnLst>
-                                </p:cTn>
-                              </p:par>
-                            </p:childTnLst>
-                          </p:cTn>
-                        </p:par>
-                      </p:childTnLst>
-                    </p:cTn>
-                  </p:par>
-                </p:childTnLst>
-              </p:cTn>
-              <p:prevCondLst>
-                <p:cond evt="onPrev" delay="0">
-                  <p:tgtEl>
-                    <p:sldTgt/>
-                  </p:tgtEl>
-                </p:cond>
-              </p:prevCondLst>
-              <p:nextCondLst>
-                <p:cond evt="onNext" delay="0">
-                  <p:tgtEl>
-                    <p:sldTgt/>
-                  </p:tgtEl>
-                </p:cond>
-              </p:nextCondLst>
-            </p:seq>
-          </p:childTnLst>
-        </p:cTn>
-      </p:par>
-    </p:tnLst>
-  </p:timing>
 </p:sld>
 </file>
 
@@ -13915,8 +13811,124 @@
         </p:blipFill>
         <p:spPr>
           <a:xfrm>
-            <a:off x="2778529" y="1389505"/>
+            <a:off x="5118908" y="1443073"/>
             <a:ext cx="3586942" cy="2981166"/>
+          </a:xfrm>
+          <a:prstGeom prst="rect">
+            <a:avLst/>
+          </a:prstGeom>
+        </p:spPr>
+      </p:pic>
+      <p:pic>
+        <p:nvPicPr>
+          <p:cNvPr id="8" name="Picture 7">
+            <a:extLst>
+              <a:ext uri="{FF2B5EF4-FFF2-40B4-BE49-F238E27FC236}">
+                <a16:creationId xmlns:a16="http://schemas.microsoft.com/office/drawing/2014/main" id="{8E010ECF-04E4-A08C-20AA-FC4A041BA39B}"/>
+              </a:ext>
+            </a:extLst>
+          </p:cNvPr>
+          <p:cNvPicPr>
+            <a:picLocks noChangeAspect="1"/>
+          </p:cNvPicPr>
+          <p:nvPr/>
+        </p:nvPicPr>
+        <p:blipFill>
+          <a:blip r:embed="rId3">
+            <a:extLst>
+              <a:ext uri="{BEBA8EAE-BF5A-486C-A8C5-ECC9F3942E4B}">
+                <a14:imgProps xmlns:a14="http://schemas.microsoft.com/office/drawing/2010/main">
+                  <a14:imgLayer r:embed="rId4">
+                    <a14:imgEffect>
+                      <a14:backgroundRemoval t="2392" b="99851" l="1519" r="99650">
+                        <a14:foregroundMark x1="73311" y1="91443" x2="77921" y2="97160"/>
+                        <a14:foregroundMark x1="70763" y1="88282" x2="71514" y2="89214"/>
+                        <a14:foregroundMark x1="1519" y1="2392" x2="68096" y2="84973"/>
+                        <a14:foregroundMark x1="69743" y1="78176" x2="91589" y2="6726"/>
+                        <a14:foregroundMark x1="91589" y1="6726" x2="96145" y2="5082"/>
+                        <a14:foregroundMark x1="92523" y1="25859" x2="98832" y2="9268"/>
+                        <a14:foregroundMark x1="98832" y1="9268" x2="99766" y2="8072"/>
+                        <a14:foregroundMark x1="97079" y1="98954" x2="99533" y2="99552"/>
+                        <a14:foregroundMark x1="94509" y1="99253" x2="96729" y2="99851"/>
+                        <a14:backgroundMark x1="99065" y1="49178" x2="95444" y2="63976"/>
+                        <a14:backgroundMark x1="95444" y1="63976" x2="95794" y2="81465"/>
+                        <a14:backgroundMark x1="95794" y1="81465" x2="95794" y2="81465"/>
+                        <a14:backgroundMark x1="97547" y1="53662" x2="81425" y2="98057"/>
+                        <a14:backgroundMark x1="81425" y1="98057" x2="93925" y2="56353"/>
+                        <a14:backgroundMark x1="93925" y1="56353" x2="99883" y2="60837"/>
+                        <a14:backgroundMark x1="97664" y1="45590" x2="84579" y2="71450"/>
+                        <a14:backgroundMark x1="84579" y1="71450" x2="89603" y2="89985"/>
+                        <a14:backgroundMark x1="89603" y1="89985" x2="99182" y2="56652"/>
+                        <a14:backgroundMark x1="99182" y1="56652" x2="97547" y2="45590"/>
+                        <a14:backgroundMark x1="97430" y1="40359" x2="83294" y2="69806"/>
+                        <a14:backgroundMark x1="83294" y1="69806" x2="79673" y2="87444"/>
+                        <a14:backgroundMark x1="79673" y1="87444" x2="92640" y2="95516"/>
+                        <a14:backgroundMark x1="92640" y1="95516" x2="93341" y2="93423"/>
+                        <a14:backgroundMark x1="95911" y1="43348" x2="86682" y2="51121"/>
+                        <a14:backgroundMark x1="86682" y1="51121" x2="69393" y2="85052"/>
+                        <a14:backgroundMark x1="69393" y1="85052" x2="69276" y2="88191"/>
+                        <a14:backgroundMark x1="70911" y1="89537" x2="71846" y2="92227"/>
+                        <a14:backgroundMark x1="73481" y1="86697" x2="98364" y2="51868"/>
+                        <a14:backgroundMark x1="86098" y1="59043" x2="86098" y2="59043"/>
+                        <a14:backgroundMark x1="87150" y1="60090" x2="87150" y2="60090"/>
+                        <a14:backgroundMark x1="95327" y1="44395" x2="82593" y2="92975"/>
+                        <a14:backgroundMark x1="82593" y1="92975" x2="82593" y2="92975"/>
+                        <a14:backgroundMark x1="96612" y1="94619" x2="93458" y2="32586"/>
+                        <a14:backgroundMark x1="98598" y1="85501" x2="98949" y2="79671"/>
+                        <a14:backgroundMark x1="97196" y1="75336" x2="98598" y2="40508"/>
+                        <a14:backgroundMark x1="99065" y1="71151" x2="99065" y2="45590"/>
+                        <a14:backgroundMark x1="96729" y1="50075" x2="84112" y2="90284"/>
+                        <a14:backgroundMark x1="84112" y1="90284" x2="93341" y2="97608"/>
+                        <a14:backgroundMark x1="93341" y1="97608" x2="93341" y2="97608"/>
+                        <a14:backgroundMark x1="92991" y1="95516" x2="98598" y2="69507"/>
+                        <a14:backgroundMark x1="98598" y1="69507" x2="99766" y2="67265"/>
+                        <a14:backgroundMark x1="97079" y1="72646" x2="99416" y2="92825"/>
+                        <a14:backgroundMark x1="96612" y1="93423" x2="99416" y2="58146"/>
+                        <a14:backgroundMark x1="99416" y1="58146" x2="99299" y2="55605"/>
+                        <a14:backgroundMark x1="96145" y1="87593" x2="98832" y2="47534"/>
+                        <a14:backgroundMark x1="89486" y1="58595" x2="83995" y2="69208"/>
+                        <a14:backgroundMark x1="83995" y1="69208" x2="81425" y2="85202"/>
+                        <a14:backgroundMark x1="81425" y1="85202" x2="91706" y2="91181"/>
+                        <a14:backgroundMark x1="91706" y1="91181" x2="99766" y2="81315"/>
+                        <a14:backgroundMark x1="95444" y1="84155" x2="92874" y2="98057"/>
+                        <a14:backgroundMark x1="92874" y1="98057" x2="99299" y2="94619"/>
+                        <a14:backgroundMark x1="96729" y1="91181" x2="95794" y2="80269"/>
+                        <a14:backgroundMark x1="96495" y1="92377" x2="96495" y2="92377"/>
+                        <a14:backgroundMark x1="95444" y1="93572" x2="95444" y2="93572"/>
+                        <a14:backgroundMark x1="94042" y1="94320" x2="99065" y2="87593"/>
+                        <a14:backgroundMark x1="95327" y1="93124" x2="99766" y2="91330"/>
+                        <a14:backgroundMark x1="94276" y1="97010" x2="98949" y2="93722"/>
+                        <a14:backgroundMark x1="98131" y1="94619" x2="94393" y2="57848"/>
+                        <a14:backgroundMark x1="95911" y1="92377" x2="95327" y2="46188"/>
+                        <a14:backgroundMark x1="96729" y1="71450" x2="98481" y2="38714"/>
+                        <a14:backgroundMark x1="93458" y1="55157" x2="97547" y2="38416"/>
+                        <a14:backgroundMark x1="97547" y1="38416" x2="97897" y2="37818"/>
+                        <a14:backgroundMark x1="98949" y1="42152" x2="99766" y2="68460"/>
+                        <a14:backgroundMark x1="98131" y1="70105" x2="99883" y2="59492"/>
+                        <a14:backgroundMark x1="94977" y1="59791" x2="99766" y2="43946"/>
+                        <a14:backgroundMark x1="99766" y1="43946" x2="99766" y2="43946"/>
+                        <a14:backgroundMark x1="92173" y1="57250" x2="99766" y2="39163"/>
+                        <a14:backgroundMark x1="99766" y1="39163" x2="99766" y2="39163"/>
+                        <a14:backgroundMark x1="83061" y1="79522" x2="97547" y2="46188"/>
+                        <a14:backgroundMark x1="97547" y1="46188" x2="97547" y2="46188"/>
+                        <a14:backgroundMark x1="94042" y1="53363" x2="95210" y2="98206"/>
+                        <a14:backgroundMark x1="95444" y1="93124" x2="96902" y2="96939"/>
+                        <a14:backgroundMark x1="96262" y1="94320" x2="95367" y2="97756"/>
+                      </a14:backgroundRemoval>
+                    </a14:imgEffect>
+                  </a14:imgLayer>
+                </a14:imgProps>
+              </a:ext>
+            </a:extLst>
+          </a:blip>
+          <a:stretch>
+            <a:fillRect/>
+          </a:stretch>
+        </p:blipFill>
+        <p:spPr>
+          <a:xfrm>
+            <a:off x="720000" y="1165860"/>
+            <a:ext cx="4855478" cy="3794760"/>
           </a:xfrm>
           <a:prstGeom prst="rect">
             <a:avLst/>
@@ -14061,8 +14073,38 @@
         </p:blipFill>
         <p:spPr>
           <a:xfrm>
-            <a:off x="2720340" y="1307678"/>
-            <a:ext cx="3297383" cy="3376058"/>
+            <a:off x="5079920" y="1249681"/>
+            <a:ext cx="3501553" cy="3585100"/>
+          </a:xfrm>
+          <a:prstGeom prst="rect">
+            <a:avLst/>
+          </a:prstGeom>
+        </p:spPr>
+      </p:pic>
+      <p:pic>
+        <p:nvPicPr>
+          <p:cNvPr id="6" name="Picture 5">
+            <a:extLst>
+              <a:ext uri="{FF2B5EF4-FFF2-40B4-BE49-F238E27FC236}">
+                <a16:creationId xmlns:a16="http://schemas.microsoft.com/office/drawing/2014/main" id="{927729E3-9F5A-CA48-CAA2-9D409F76BFC3}"/>
+              </a:ext>
+            </a:extLst>
+          </p:cNvPr>
+          <p:cNvPicPr>
+            <a:picLocks noChangeAspect="1"/>
+          </p:cNvPicPr>
+          <p:nvPr/>
+        </p:nvPicPr>
+        <p:blipFill>
+          <a:blip r:embed="rId3"/>
+          <a:stretch>
+            <a:fillRect/>
+          </a:stretch>
+        </p:blipFill>
+        <p:spPr>
+          <a:xfrm>
+            <a:off x="720000" y="1134492"/>
+            <a:ext cx="4111080" cy="3996485"/>
           </a:xfrm>
           <a:prstGeom prst="rect">
             <a:avLst/>
@@ -14107,6 +14149,36 @@
       </p:grpSpPr>
       <p:pic>
         <p:nvPicPr>
+          <p:cNvPr id="7" name="Picture 6">
+            <a:extLst>
+              <a:ext uri="{FF2B5EF4-FFF2-40B4-BE49-F238E27FC236}">
+                <a16:creationId xmlns:a16="http://schemas.microsoft.com/office/drawing/2014/main" id="{1F6FDC9B-7ADB-25AB-08E1-EBD292DED670}"/>
+              </a:ext>
+            </a:extLst>
+          </p:cNvPr>
+          <p:cNvPicPr>
+            <a:picLocks noChangeAspect="1"/>
+          </p:cNvPicPr>
+          <p:nvPr/>
+        </p:nvPicPr>
+        <p:blipFill>
+          <a:blip r:embed="rId2"/>
+          <a:stretch>
+            <a:fillRect/>
+          </a:stretch>
+        </p:blipFill>
+        <p:spPr>
+          <a:xfrm>
+            <a:off x="720000" y="1802433"/>
+            <a:ext cx="4476840" cy="1538634"/>
+          </a:xfrm>
+          <a:prstGeom prst="rect">
+            <a:avLst/>
+          </a:prstGeom>
+        </p:spPr>
+      </p:pic>
+      <p:pic>
+        <p:nvPicPr>
           <p:cNvPr id="5" name="Picture 4" descr="A diagram of a diagram&#10;&#10;AI-generated content may be incorrect.">
             <a:extLst>
               <a:ext uri="{FF2B5EF4-FFF2-40B4-BE49-F238E27FC236}">
@@ -14120,7 +14192,7 @@
           <p:nvPr/>
         </p:nvPicPr>
         <p:blipFill>
-          <a:blip r:embed="rId2"/>
+          <a:blip r:embed="rId3"/>
           <a:srcRect l="51088" t="42088" r="-100" b="5589"/>
           <a:stretch>
             <a:fillRect/>
@@ -14128,7 +14200,7 @@
         </p:blipFill>
         <p:spPr>
           <a:xfrm>
-            <a:off x="5061099" y="1243577"/>
+            <a:off x="5152449" y="1243577"/>
             <a:ext cx="3362901" cy="3523686"/>
           </a:xfrm>
           <a:prstGeom prst="rect">
@@ -14217,37 +14289,6 @@
           </a:p>
         </p:txBody>
       </p:sp>
-      <p:pic>
-        <p:nvPicPr>
-          <p:cNvPr id="6" name="Picture 5">
-            <a:extLst>
-              <a:ext uri="{FF2B5EF4-FFF2-40B4-BE49-F238E27FC236}">
-                <a16:creationId xmlns:a16="http://schemas.microsoft.com/office/drawing/2014/main" id="{82D53307-2EE7-ABE6-7E1F-11005C841970}"/>
-              </a:ext>
-            </a:extLst>
-          </p:cNvPr>
-          <p:cNvPicPr>
-            <a:picLocks noChangeAspect="1"/>
-          </p:cNvPicPr>
-          <p:nvPr/>
-        </p:nvPicPr>
-        <p:blipFill>
-          <a:blip r:embed="rId3"/>
-          <a:srcRect r="5817"/>
-          <a:stretch>
-            <a:fillRect/>
-          </a:stretch>
-        </p:blipFill>
-        <p:spPr>
-          <a:xfrm>
-            <a:off x="652839" y="1650170"/>
-            <a:ext cx="4559240" cy="1665771"/>
-          </a:xfrm>
-          <a:prstGeom prst="rect">
-            <a:avLst/>
-          </a:prstGeom>
-        </p:spPr>
-      </p:pic>
     </p:spTree>
     <p:extLst>
       <p:ext uri="{BB962C8B-B14F-4D97-AF65-F5344CB8AC3E}">
@@ -14581,7 +14622,7 @@
               <a:rPr lang="en-US" sz="1200" dirty="0">
                 <a:latin typeface="Archivo"/>
               </a:rPr>
-              <a:t>No improvements identified after 5000 idle iterations;</a:t>
+              <a:t>No improvements identified after a predefined number of idle iterations;</a:t>
             </a:r>
           </a:p>
           <a:p>
@@ -14703,36 +14744,6 @@
           </a:p>
         </p:txBody>
       </p:sp>
-      <p:pic>
-        <p:nvPicPr>
-          <p:cNvPr id="5" name="Picture 4" descr="Several different types of diagram&#10;&#10;AI-generated content may be incorrect.">
-            <a:extLst>
-              <a:ext uri="{FF2B5EF4-FFF2-40B4-BE49-F238E27FC236}">
-                <a16:creationId xmlns:a16="http://schemas.microsoft.com/office/drawing/2014/main" id="{313C1BEA-D0DA-EB4C-8B08-3965DB2111B7}"/>
-              </a:ext>
-            </a:extLst>
-          </p:cNvPr>
-          <p:cNvPicPr>
-            <a:picLocks noChangeAspect="1"/>
-          </p:cNvPicPr>
-          <p:nvPr/>
-        </p:nvPicPr>
-        <p:blipFill>
-          <a:blip r:embed="rId2"/>
-          <a:stretch>
-            <a:fillRect/>
-          </a:stretch>
-        </p:blipFill>
-        <p:spPr>
-          <a:xfrm>
-            <a:off x="1974273" y="1129148"/>
-            <a:ext cx="4911436" cy="3784422"/>
-          </a:xfrm>
-          <a:prstGeom prst="rect">
-            <a:avLst/>
-          </a:prstGeom>
-        </p:spPr>
-      </p:pic>
       <p:sp>
         <p:nvSpPr>
           <p:cNvPr id="6" name="TextBox 5">
@@ -14809,129 +14820,12 @@
           </a:p>
         </p:txBody>
       </p:sp>
-    </p:spTree>
-    <p:extLst>
-      <p:ext uri="{BB962C8B-B14F-4D97-AF65-F5344CB8AC3E}">
-        <p14:creationId xmlns:p14="http://schemas.microsoft.com/office/powerpoint/2010/main" val="1357375625"/>
-      </p:ext>
-    </p:extLst>
-  </p:cSld>
-  <p:clrMapOvr>
-    <a:masterClrMapping/>
-  </p:clrMapOvr>
-</p:sld>
-</file>
-
-<file path=ppt/slides/slide17.xml><?xml version="1.0" encoding="utf-8"?>
-<p:sld xmlns:a="http://schemas.openxmlformats.org/drawingml/2006/main" xmlns:r="http://schemas.openxmlformats.org/officeDocument/2006/relationships" xmlns:p="http://schemas.openxmlformats.org/presentationml/2006/main">
-  <p:cSld>
-    <p:spTree>
-      <p:nvGrpSpPr>
-        <p:cNvPr id="1" name="">
-          <a:extLst>
-            <a:ext uri="{FF2B5EF4-FFF2-40B4-BE49-F238E27FC236}">
-              <a16:creationId xmlns:a16="http://schemas.microsoft.com/office/drawing/2014/main" id="{10560AB6-96EA-D8E1-0D95-0A9395B1B760}"/>
-            </a:ext>
-          </a:extLst>
-        </p:cNvPr>
-        <p:cNvGrpSpPr/>
-        <p:nvPr/>
-      </p:nvGrpSpPr>
-      <p:grpSpPr>
-        <a:xfrm>
-          <a:off x="0" y="0"/>
-          <a:ext cx="0" cy="0"/>
-          <a:chOff x="0" y="0"/>
-          <a:chExt cx="0" cy="0"/>
-        </a:xfrm>
-      </p:grpSpPr>
-      <p:sp>
-        <p:nvSpPr>
-          <p:cNvPr id="2" name="Title 1">
+      <p:pic>
+        <p:nvPicPr>
+          <p:cNvPr id="7" name="Picture 6">
             <a:extLst>
               <a:ext uri="{FF2B5EF4-FFF2-40B4-BE49-F238E27FC236}">
-                <a16:creationId xmlns:a16="http://schemas.microsoft.com/office/drawing/2014/main" id="{FDAF2431-E217-0C2D-1ED9-DF13631CCF38}"/>
-              </a:ext>
-            </a:extLst>
-          </p:cNvPr>
-          <p:cNvSpPr>
-            <a:spLocks noGrp="1"/>
-          </p:cNvSpPr>
-          <p:nvPr>
-            <p:ph type="title"/>
-          </p:nvPr>
-        </p:nvSpPr>
-        <p:spPr/>
-        <p:txBody>
-          <a:bodyPr/>
-          <a:lstStyle/>
-          <a:p>
-            <a:r>
-              <a:rPr lang="pt-PT" dirty="0" err="1"/>
-              <a:t>Methodology</a:t>
-            </a:r>
-            <a:r>
-              <a:rPr lang="pt-PT" dirty="0"/>
-              <a:t>: </a:t>
-            </a:r>
-            <a:r>
-              <a:rPr lang="pt-PT" b="0" dirty="0"/>
-              <a:t>Monte-Carlo </a:t>
-            </a:r>
-            <a:r>
-              <a:rPr lang="pt-PT" b="0" dirty="0" err="1"/>
-              <a:t>Tree</a:t>
-            </a:r>
-            <a:r>
-              <a:rPr lang="pt-PT" b="0" dirty="0"/>
-              <a:t> </a:t>
-            </a:r>
-            <a:r>
-              <a:rPr lang="pt-PT" b="0" dirty="0" err="1"/>
-              <a:t>Search</a:t>
-            </a:r>
-            <a:r>
-              <a:rPr lang="pt-PT" b="0" dirty="0"/>
-              <a:t> (MCTS)</a:t>
-            </a:r>
-          </a:p>
-        </p:txBody>
-      </p:sp>
-      <p:sp>
-        <p:nvSpPr>
-          <p:cNvPr id="3" name="Slide Number Placeholder 2">
-            <a:extLst>
-              <a:ext uri="{FF2B5EF4-FFF2-40B4-BE49-F238E27FC236}">
-                <a16:creationId xmlns:a16="http://schemas.microsoft.com/office/drawing/2014/main" id="{A0376DA5-9BBC-DE3D-108D-A42117F1AF57}"/>
-              </a:ext>
-            </a:extLst>
-          </p:cNvPr>
-          <p:cNvSpPr>
-            <a:spLocks noGrp="1"/>
-          </p:cNvSpPr>
-          <p:nvPr>
-            <p:ph type="sldNum" sz="quarter" idx="11"/>
-          </p:nvPr>
-        </p:nvSpPr>
-        <p:spPr/>
-        <p:txBody>
-          <a:bodyPr/>
-          <a:lstStyle/>
-          <a:p>
-            <a:fld id="{8BC8727B-4240-4963-929A-A961B0E9EF8D}" type="slidenum">
-              <a:rPr lang="pt-PT" smtClean="0"/>
-              <a:t>17</a:t>
-            </a:fld>
-            <a:endParaRPr lang="pt-PT"/>
-          </a:p>
-        </p:txBody>
-      </p:sp>
-      <p:pic>
-        <p:nvPicPr>
-          <p:cNvPr id="6" name="Picture 5" descr="A diagram of a tree&#10;&#10;AI-generated content may be incorrect.">
-            <a:extLst>
-              <a:ext uri="{FF2B5EF4-FFF2-40B4-BE49-F238E27FC236}">
-                <a16:creationId xmlns:a16="http://schemas.microsoft.com/office/drawing/2014/main" id="{BAB72E71-3BC3-92B5-9B8B-71E69A7D5295}"/>
+                <a16:creationId xmlns:a16="http://schemas.microsoft.com/office/drawing/2014/main" id="{4F8D54C4-E5F8-DEBB-99AD-483C43BF31F3}"/>
               </a:ext>
             </a:extLst>
           </p:cNvPr>
@@ -14948,8 +14842,8 @@
         </p:blipFill>
         <p:spPr>
           <a:xfrm>
-            <a:off x="1967989" y="1310596"/>
-            <a:ext cx="4489961" cy="3246120"/>
+            <a:off x="2018872" y="1100050"/>
+            <a:ext cx="5159167" cy="3851911"/>
           </a:xfrm>
           <a:prstGeom prst="rect">
             <a:avLst/>
@@ -14959,7 +14853,7 @@
     </p:spTree>
     <p:extLst>
       <p:ext uri="{BB962C8B-B14F-4D97-AF65-F5344CB8AC3E}">
-        <p14:creationId xmlns:p14="http://schemas.microsoft.com/office/powerpoint/2010/main" val="2249692475"/>
+        <p14:creationId xmlns:p14="http://schemas.microsoft.com/office/powerpoint/2010/main" val="1357375625"/>
       </p:ext>
     </p:extLst>
   </p:cSld>
@@ -14969,7 +14863,7 @@
 </p:sld>
 </file>
 
-<file path=ppt/slides/slide18.xml><?xml version="1.0" encoding="utf-8"?>
+<file path=ppt/slides/slide17.xml><?xml version="1.0" encoding="utf-8"?>
 <p:sld xmlns:a="http://schemas.openxmlformats.org/drawingml/2006/main" xmlns:r="http://schemas.openxmlformats.org/officeDocument/2006/relationships" xmlns:p="http://schemas.openxmlformats.org/presentationml/2006/main">
   <p:cSld>
     <p:spTree>
@@ -15047,7 +14941,7 @@
           <a:p>
             <a:fld id="{8BC8727B-4240-4963-929A-A961B0E9EF8D}" type="slidenum">
               <a:rPr lang="pt-PT" smtClean="0"/>
-              <a:t>18</a:t>
+              <a:t>17</a:t>
             </a:fld>
             <a:endParaRPr lang="pt-PT" dirty="0"/>
           </a:p>
@@ -26660,7 +26554,7 @@
 </p:sld>
 </file>
 
-<file path=ppt/slides/slide19.xml><?xml version="1.0" encoding="utf-8"?>
+<file path=ppt/slides/slide18.xml><?xml version="1.0" encoding="utf-8"?>
 <p:sld xmlns:a="http://schemas.openxmlformats.org/drawingml/2006/main" xmlns:r="http://schemas.openxmlformats.org/officeDocument/2006/relationships" xmlns:p="http://schemas.openxmlformats.org/presentationml/2006/main">
   <p:cSld>
     <p:spTree>
@@ -26738,7 +26632,7 @@
           <a:p>
             <a:fld id="{8BC8727B-4240-4963-929A-A961B0E9EF8D}" type="slidenum">
               <a:rPr lang="pt-PT" smtClean="0"/>
-              <a:t>19</a:t>
+              <a:t>18</a:t>
             </a:fld>
             <a:endParaRPr lang="pt-PT" dirty="0"/>
           </a:p>
@@ -26981,6 +26875,232 @@
     <p:extLst>
       <p:ext uri="{BB962C8B-B14F-4D97-AF65-F5344CB8AC3E}">
         <p14:creationId xmlns:p14="http://schemas.microsoft.com/office/powerpoint/2010/main" val="2834391204"/>
+      </p:ext>
+    </p:extLst>
+  </p:cSld>
+  <p:clrMapOvr>
+    <a:masterClrMapping/>
+  </p:clrMapOvr>
+</p:sld>
+</file>
+
+<file path=ppt/slides/slide19.xml><?xml version="1.0" encoding="utf-8"?>
+<p:sld xmlns:a="http://schemas.openxmlformats.org/drawingml/2006/main" xmlns:r="http://schemas.openxmlformats.org/officeDocument/2006/relationships" xmlns:p="http://schemas.openxmlformats.org/presentationml/2006/main">
+  <p:cSld>
+    <p:spTree>
+      <p:nvGrpSpPr>
+        <p:cNvPr id="1" name="">
+          <a:extLst>
+            <a:ext uri="{FF2B5EF4-FFF2-40B4-BE49-F238E27FC236}">
+              <a16:creationId xmlns:a16="http://schemas.microsoft.com/office/drawing/2014/main" id="{109E24CF-489B-180C-BB38-AAC2DD286026}"/>
+            </a:ext>
+          </a:extLst>
+        </p:cNvPr>
+        <p:cNvGrpSpPr/>
+        <p:nvPr/>
+      </p:nvGrpSpPr>
+      <p:grpSpPr>
+        <a:xfrm>
+          <a:off x="0" y="0"/>
+          <a:ext cx="0" cy="0"/>
+          <a:chOff x="0" y="0"/>
+          <a:chExt cx="0" cy="0"/>
+        </a:xfrm>
+      </p:grpSpPr>
+      <p:sp>
+        <p:nvSpPr>
+          <p:cNvPr id="2" name="Title 1">
+            <a:extLst>
+              <a:ext uri="{FF2B5EF4-FFF2-40B4-BE49-F238E27FC236}">
+                <a16:creationId xmlns:a16="http://schemas.microsoft.com/office/drawing/2014/main" id="{4627D3D8-A3C6-20EB-55D0-52BA8ED2B8CA}"/>
+              </a:ext>
+            </a:extLst>
+          </p:cNvPr>
+          <p:cNvSpPr>
+            <a:spLocks noGrp="1"/>
+          </p:cNvSpPr>
+          <p:nvPr>
+            <p:ph type="title"/>
+          </p:nvPr>
+        </p:nvSpPr>
+        <p:spPr/>
+        <p:txBody>
+          <a:bodyPr/>
+          <a:lstStyle/>
+          <a:p>
+            <a:r>
+              <a:rPr lang="en-US" dirty="0"/>
+              <a:t>Results</a:t>
+            </a:r>
+            <a:endParaRPr lang="en-US" b="0" dirty="0"/>
+          </a:p>
+        </p:txBody>
+      </p:sp>
+      <p:sp>
+        <p:nvSpPr>
+          <p:cNvPr id="3" name="Slide Number Placeholder 2">
+            <a:extLst>
+              <a:ext uri="{FF2B5EF4-FFF2-40B4-BE49-F238E27FC236}">
+                <a16:creationId xmlns:a16="http://schemas.microsoft.com/office/drawing/2014/main" id="{C3F70DED-62E6-6113-7ACF-2996809A1B08}"/>
+              </a:ext>
+            </a:extLst>
+          </p:cNvPr>
+          <p:cNvSpPr>
+            <a:spLocks noGrp="1"/>
+          </p:cNvSpPr>
+          <p:nvPr>
+            <p:ph type="sldNum" sz="quarter" idx="11"/>
+          </p:nvPr>
+        </p:nvSpPr>
+        <p:spPr/>
+        <p:txBody>
+          <a:bodyPr/>
+          <a:lstStyle/>
+          <a:p>
+            <a:fld id="{8BC8727B-4240-4963-929A-A961B0E9EF8D}" type="slidenum">
+              <a:rPr lang="pt-PT" smtClean="0"/>
+              <a:t>19</a:t>
+            </a:fld>
+            <a:endParaRPr lang="pt-PT" dirty="0"/>
+          </a:p>
+        </p:txBody>
+      </p:sp>
+      <p:sp>
+        <p:nvSpPr>
+          <p:cNvPr id="5" name="TextBox 4">
+            <a:extLst>
+              <a:ext uri="{FF2B5EF4-FFF2-40B4-BE49-F238E27FC236}">
+                <a16:creationId xmlns:a16="http://schemas.microsoft.com/office/drawing/2014/main" id="{D2B10A08-7024-13C0-5FCA-D53D38B03325}"/>
+              </a:ext>
+            </a:extLst>
+          </p:cNvPr>
+          <p:cNvSpPr txBox="1"/>
+          <p:nvPr/>
+        </p:nvSpPr>
+        <p:spPr>
+          <a:xfrm>
+            <a:off x="658090" y="1414441"/>
+            <a:ext cx="7516091" cy="1077218"/>
+          </a:xfrm>
+          <a:prstGeom prst="rect">
+            <a:avLst/>
+          </a:prstGeom>
+          <a:noFill/>
+        </p:spPr>
+        <p:txBody>
+          <a:bodyPr wrap="square">
+            <a:spAutoFit/>
+          </a:bodyPr>
+          <a:lstStyle/>
+          <a:p>
+            <a:pPr marL="171450" indent="-171450">
+              <a:buFont typeface="Arial" panose="020B0604020202020204" pitchFamily="34" charset="0"/>
+              <a:buChar char="•"/>
+            </a:pPr>
+            <a:r>
+              <a:rPr lang="en-US" sz="1200" dirty="0">
+                <a:latin typeface="Archivo"/>
+              </a:rPr>
+              <a:t>Python vs </a:t>
+            </a:r>
+            <a:r>
+              <a:rPr lang="en-US" sz="1200" dirty="0" err="1">
+                <a:latin typeface="Archivo"/>
+              </a:rPr>
+              <a:t>PyPy</a:t>
+            </a:r>
+            <a:r>
+              <a:rPr lang="en-US" sz="1200" dirty="0">
+                <a:latin typeface="Archivo"/>
+              </a:rPr>
+              <a:t> Performance Evaluation </a:t>
+            </a:r>
+            <a:r>
+              <a:rPr lang="pt-PT" dirty="0"/>
+              <a:t>→ </a:t>
+            </a:r>
+            <a:r>
+              <a:rPr lang="en-US" sz="1200" b="1" dirty="0" err="1">
+                <a:latin typeface="Archivo"/>
+              </a:rPr>
+              <a:t>PyPy</a:t>
+            </a:r>
+            <a:r>
+              <a:rPr lang="en-US" sz="1200" b="1" dirty="0">
+                <a:latin typeface="Archivo"/>
+              </a:rPr>
+              <a:t> called over 3x more functions</a:t>
+            </a:r>
+          </a:p>
+          <a:p>
+            <a:pPr marL="171450" indent="-171450">
+              <a:buFont typeface="Arial" panose="020B0604020202020204" pitchFamily="34" charset="0"/>
+              <a:buChar char="•"/>
+            </a:pPr>
+            <a:endParaRPr lang="en-US" sz="1200" dirty="0">
+              <a:latin typeface="Archivo"/>
+            </a:endParaRPr>
+          </a:p>
+          <a:p>
+            <a:pPr marL="171450" indent="-171450">
+              <a:buFont typeface="Arial" panose="020B0604020202020204" pitchFamily="34" charset="0"/>
+              <a:buChar char="•"/>
+            </a:pPr>
+            <a:r>
+              <a:rPr lang="en-US" sz="1200" dirty="0">
+                <a:latin typeface="Archivo"/>
+              </a:rPr>
+              <a:t>All tests have consistently produced </a:t>
+            </a:r>
+            <a:r>
+              <a:rPr lang="en-US" sz="1200" b="1" dirty="0">
+                <a:latin typeface="Archivo"/>
+              </a:rPr>
+              <a:t>feasible solutions </a:t>
+            </a:r>
+            <a:r>
+              <a:rPr lang="en-US" sz="1200" dirty="0">
+                <a:latin typeface="Archivo"/>
+              </a:rPr>
+              <a:t>in the challenging ITC-2007 set of benchmark instances. </a:t>
+            </a:r>
+          </a:p>
+          <a:p>
+            <a:pPr marL="285750" indent="-285750">
+              <a:buFont typeface="Arial" panose="020B0604020202020204" pitchFamily="34" charset="0"/>
+              <a:buChar char="•"/>
+            </a:pPr>
+            <a:endParaRPr lang="en-US" dirty="0">
+              <a:latin typeface="Archivo"/>
+            </a:endParaRPr>
+          </a:p>
+          <a:p>
+            <a:pPr marL="171450" indent="-171450">
+              <a:buFont typeface="Arial" panose="020B0604020202020204" pitchFamily="34" charset="0"/>
+              <a:buChar char="•"/>
+            </a:pPr>
+            <a:r>
+              <a:rPr lang="en-US" sz="1200" b="1" dirty="0">
+                <a:latin typeface="Archivo"/>
+              </a:rPr>
+              <a:t>C showed minimal impact on results</a:t>
+            </a:r>
+            <a:r>
+              <a:rPr lang="en-US" sz="1200" dirty="0">
+                <a:latin typeface="Archivo"/>
+              </a:rPr>
+              <a:t>, indicating a weaker-than-expected influence on node selection.</a:t>
+            </a:r>
+            <a:endParaRPr lang="pt-PT" sz="1200" dirty="0">
+              <a:latin typeface="Archivo"/>
+            </a:endParaRPr>
+          </a:p>
+        </p:txBody>
+      </p:sp>
+    </p:spTree>
+    <p:extLst>
+      <p:ext uri="{BB962C8B-B14F-4D97-AF65-F5344CB8AC3E}">
+        <p14:creationId xmlns:p14="http://schemas.microsoft.com/office/powerpoint/2010/main" val="3433714800"/>
       </p:ext>
     </p:extLst>
   </p:cSld>
@@ -27567,232 +27687,6 @@
         <p:cNvPr id="1" name="">
           <a:extLst>
             <a:ext uri="{FF2B5EF4-FFF2-40B4-BE49-F238E27FC236}">
-              <a16:creationId xmlns:a16="http://schemas.microsoft.com/office/drawing/2014/main" id="{109E24CF-489B-180C-BB38-AAC2DD286026}"/>
-            </a:ext>
-          </a:extLst>
-        </p:cNvPr>
-        <p:cNvGrpSpPr/>
-        <p:nvPr/>
-      </p:nvGrpSpPr>
-      <p:grpSpPr>
-        <a:xfrm>
-          <a:off x="0" y="0"/>
-          <a:ext cx="0" cy="0"/>
-          <a:chOff x="0" y="0"/>
-          <a:chExt cx="0" cy="0"/>
-        </a:xfrm>
-      </p:grpSpPr>
-      <p:sp>
-        <p:nvSpPr>
-          <p:cNvPr id="2" name="Title 1">
-            <a:extLst>
-              <a:ext uri="{FF2B5EF4-FFF2-40B4-BE49-F238E27FC236}">
-                <a16:creationId xmlns:a16="http://schemas.microsoft.com/office/drawing/2014/main" id="{4627D3D8-A3C6-20EB-55D0-52BA8ED2B8CA}"/>
-              </a:ext>
-            </a:extLst>
-          </p:cNvPr>
-          <p:cNvSpPr>
-            <a:spLocks noGrp="1"/>
-          </p:cNvSpPr>
-          <p:nvPr>
-            <p:ph type="title"/>
-          </p:nvPr>
-        </p:nvSpPr>
-        <p:spPr/>
-        <p:txBody>
-          <a:bodyPr/>
-          <a:lstStyle/>
-          <a:p>
-            <a:r>
-              <a:rPr lang="en-US" dirty="0"/>
-              <a:t>Results</a:t>
-            </a:r>
-            <a:endParaRPr lang="en-US" b="0" dirty="0"/>
-          </a:p>
-        </p:txBody>
-      </p:sp>
-      <p:sp>
-        <p:nvSpPr>
-          <p:cNvPr id="3" name="Slide Number Placeholder 2">
-            <a:extLst>
-              <a:ext uri="{FF2B5EF4-FFF2-40B4-BE49-F238E27FC236}">
-                <a16:creationId xmlns:a16="http://schemas.microsoft.com/office/drawing/2014/main" id="{C3F70DED-62E6-6113-7ACF-2996809A1B08}"/>
-              </a:ext>
-            </a:extLst>
-          </p:cNvPr>
-          <p:cNvSpPr>
-            <a:spLocks noGrp="1"/>
-          </p:cNvSpPr>
-          <p:nvPr>
-            <p:ph type="sldNum" sz="quarter" idx="11"/>
-          </p:nvPr>
-        </p:nvSpPr>
-        <p:spPr/>
-        <p:txBody>
-          <a:bodyPr/>
-          <a:lstStyle/>
-          <a:p>
-            <a:fld id="{8BC8727B-4240-4963-929A-A961B0E9EF8D}" type="slidenum">
-              <a:rPr lang="pt-PT" smtClean="0"/>
-              <a:t>20</a:t>
-            </a:fld>
-            <a:endParaRPr lang="pt-PT" dirty="0"/>
-          </a:p>
-        </p:txBody>
-      </p:sp>
-      <p:sp>
-        <p:nvSpPr>
-          <p:cNvPr id="5" name="TextBox 4">
-            <a:extLst>
-              <a:ext uri="{FF2B5EF4-FFF2-40B4-BE49-F238E27FC236}">
-                <a16:creationId xmlns:a16="http://schemas.microsoft.com/office/drawing/2014/main" id="{D2B10A08-7024-13C0-5FCA-D53D38B03325}"/>
-              </a:ext>
-            </a:extLst>
-          </p:cNvPr>
-          <p:cNvSpPr txBox="1"/>
-          <p:nvPr/>
-        </p:nvSpPr>
-        <p:spPr>
-          <a:xfrm>
-            <a:off x="658090" y="1414441"/>
-            <a:ext cx="7516091" cy="1077218"/>
-          </a:xfrm>
-          <a:prstGeom prst="rect">
-            <a:avLst/>
-          </a:prstGeom>
-          <a:noFill/>
-        </p:spPr>
-        <p:txBody>
-          <a:bodyPr wrap="square">
-            <a:spAutoFit/>
-          </a:bodyPr>
-          <a:lstStyle/>
-          <a:p>
-            <a:pPr marL="171450" indent="-171450">
-              <a:buFont typeface="Arial" panose="020B0604020202020204" pitchFamily="34" charset="0"/>
-              <a:buChar char="•"/>
-            </a:pPr>
-            <a:r>
-              <a:rPr lang="en-US" sz="1200" dirty="0">
-                <a:latin typeface="Archivo"/>
-              </a:rPr>
-              <a:t>Python vs </a:t>
-            </a:r>
-            <a:r>
-              <a:rPr lang="en-US" sz="1200" dirty="0" err="1">
-                <a:latin typeface="Archivo"/>
-              </a:rPr>
-              <a:t>PyPy</a:t>
-            </a:r>
-            <a:r>
-              <a:rPr lang="en-US" sz="1200" dirty="0">
-                <a:latin typeface="Archivo"/>
-              </a:rPr>
-              <a:t> Performance Evaluation </a:t>
-            </a:r>
-            <a:r>
-              <a:rPr lang="pt-PT" dirty="0"/>
-              <a:t>→ </a:t>
-            </a:r>
-            <a:r>
-              <a:rPr lang="en-US" sz="1200" b="1" dirty="0" err="1">
-                <a:latin typeface="Archivo"/>
-              </a:rPr>
-              <a:t>PyPy</a:t>
-            </a:r>
-            <a:r>
-              <a:rPr lang="en-US" sz="1200" b="1" dirty="0">
-                <a:latin typeface="Archivo"/>
-              </a:rPr>
-              <a:t> called over 3x more functions</a:t>
-            </a:r>
-          </a:p>
-          <a:p>
-            <a:pPr marL="171450" indent="-171450">
-              <a:buFont typeface="Arial" panose="020B0604020202020204" pitchFamily="34" charset="0"/>
-              <a:buChar char="•"/>
-            </a:pPr>
-            <a:endParaRPr lang="en-US" sz="1200" dirty="0">
-              <a:latin typeface="Archivo"/>
-            </a:endParaRPr>
-          </a:p>
-          <a:p>
-            <a:pPr marL="171450" indent="-171450">
-              <a:buFont typeface="Arial" panose="020B0604020202020204" pitchFamily="34" charset="0"/>
-              <a:buChar char="•"/>
-            </a:pPr>
-            <a:r>
-              <a:rPr lang="en-US" sz="1200" dirty="0">
-                <a:latin typeface="Archivo"/>
-              </a:rPr>
-              <a:t>All tests have consistently produced </a:t>
-            </a:r>
-            <a:r>
-              <a:rPr lang="en-US" sz="1200" b="1" dirty="0">
-                <a:latin typeface="Archivo"/>
-              </a:rPr>
-              <a:t>feasible solutions </a:t>
-            </a:r>
-            <a:r>
-              <a:rPr lang="en-US" sz="1200" dirty="0">
-                <a:latin typeface="Archivo"/>
-              </a:rPr>
-              <a:t>in the challenging ITC-2007 set of benchmark instances. </a:t>
-            </a:r>
-          </a:p>
-          <a:p>
-            <a:pPr marL="285750" indent="-285750">
-              <a:buFont typeface="Arial" panose="020B0604020202020204" pitchFamily="34" charset="0"/>
-              <a:buChar char="•"/>
-            </a:pPr>
-            <a:endParaRPr lang="en-US" dirty="0">
-              <a:latin typeface="Archivo"/>
-            </a:endParaRPr>
-          </a:p>
-          <a:p>
-            <a:pPr marL="171450" indent="-171450">
-              <a:buFont typeface="Arial" panose="020B0604020202020204" pitchFamily="34" charset="0"/>
-              <a:buChar char="•"/>
-            </a:pPr>
-            <a:r>
-              <a:rPr lang="en-US" sz="1200" b="1" dirty="0">
-                <a:latin typeface="Archivo"/>
-              </a:rPr>
-              <a:t>C showed minimal impact on results</a:t>
-            </a:r>
-            <a:r>
-              <a:rPr lang="en-US" sz="1200" dirty="0">
-                <a:latin typeface="Archivo"/>
-              </a:rPr>
-              <a:t>, indicating a weaker-than-expected influence on node selection.</a:t>
-            </a:r>
-            <a:endParaRPr lang="pt-PT" sz="1200" dirty="0">
-              <a:latin typeface="Archivo"/>
-            </a:endParaRPr>
-          </a:p>
-        </p:txBody>
-      </p:sp>
-    </p:spTree>
-    <p:extLst>
-      <p:ext uri="{BB962C8B-B14F-4D97-AF65-F5344CB8AC3E}">
-        <p14:creationId xmlns:p14="http://schemas.microsoft.com/office/powerpoint/2010/main" val="3433714800"/>
-      </p:ext>
-    </p:extLst>
-  </p:cSld>
-  <p:clrMapOvr>
-    <a:masterClrMapping/>
-  </p:clrMapOvr>
-</p:sld>
-</file>
-
-<file path=ppt/slides/slide21.xml><?xml version="1.0" encoding="utf-8"?>
-<p:sld xmlns:a="http://schemas.openxmlformats.org/drawingml/2006/main" xmlns:r="http://schemas.openxmlformats.org/officeDocument/2006/relationships" xmlns:p="http://schemas.openxmlformats.org/presentationml/2006/main">
-  <p:cSld>
-    <p:spTree>
-      <p:nvGrpSpPr>
-        <p:cNvPr id="1" name="">
-          <a:extLst>
-            <a:ext uri="{FF2B5EF4-FFF2-40B4-BE49-F238E27FC236}">
               <a16:creationId xmlns:a16="http://schemas.microsoft.com/office/drawing/2014/main" id="{83E37E9D-6818-4601-0797-16574D980493}"/>
             </a:ext>
           </a:extLst>
@@ -27863,7 +27757,7 @@
           <a:p>
             <a:fld id="{8BC8727B-4240-4963-929A-A961B0E9EF8D}" type="slidenum">
               <a:rPr lang="pt-PT" smtClean="0"/>
-              <a:t>21</a:t>
+              <a:t>20</a:t>
             </a:fld>
             <a:endParaRPr lang="pt-PT" dirty="0"/>
           </a:p>
@@ -28039,7 +27933,7 @@
 </p:sld>
 </file>
 
-<file path=ppt/slides/slide22.xml><?xml version="1.0" encoding="utf-8"?>
+<file path=ppt/slides/slide21.xml><?xml version="1.0" encoding="utf-8"?>
 <p:sld xmlns:a="http://schemas.openxmlformats.org/drawingml/2006/main" xmlns:r="http://schemas.openxmlformats.org/officeDocument/2006/relationships" xmlns:p="http://schemas.openxmlformats.org/presentationml/2006/main">
   <p:cSld>
     <p:spTree>
@@ -28117,7 +28011,7 @@
           <a:p>
             <a:fld id="{8BC8727B-4240-4963-929A-A961B0E9EF8D}" type="slidenum">
               <a:rPr lang="pt-PT" smtClean="0"/>
-              <a:t>22</a:t>
+              <a:t>21</a:t>
             </a:fld>
             <a:endParaRPr lang="pt-PT" dirty="0"/>
           </a:p>
@@ -28226,7 +28120,7 @@
 </p:sld>
 </file>
 
-<file path=ppt/slides/slide23.xml><?xml version="1.0" encoding="utf-8"?>
+<file path=ppt/slides/slide22.xml><?xml version="1.0" encoding="utf-8"?>
 <p:sld xmlns:a="http://schemas.openxmlformats.org/drawingml/2006/main" xmlns:r="http://schemas.openxmlformats.org/officeDocument/2006/relationships" xmlns:p="http://schemas.openxmlformats.org/presentationml/2006/main">
   <p:cSld>
     <p:spTree>
@@ -28321,7 +28215,7 @@
           <a:p>
             <a:fld id="{8BC8727B-4240-4963-929A-A961B0E9EF8D}" type="slidenum">
               <a:rPr lang="pt-PT" smtClean="0"/>
-              <a:t>23</a:t>
+              <a:t>22</a:t>
             </a:fld>
             <a:endParaRPr lang="pt-PT" dirty="0"/>
           </a:p>
@@ -28380,7 +28274,7 @@
 </p:sld>
 </file>
 
-<file path=ppt/slides/slide24.xml><?xml version="1.0" encoding="utf-8"?>
+<file path=ppt/slides/slide23.xml><?xml version="1.0" encoding="utf-8"?>
 <p:sld xmlns:a="http://schemas.openxmlformats.org/drawingml/2006/main" xmlns:r="http://schemas.openxmlformats.org/officeDocument/2006/relationships" xmlns:p="http://schemas.openxmlformats.org/presentationml/2006/main">
   <p:cSld>
     <p:spTree>
@@ -28471,7 +28365,7 @@
           <a:p>
             <a:fld id="{8BC8727B-4240-4963-929A-A961B0E9EF8D}" type="slidenum">
               <a:rPr lang="pt-PT" smtClean="0"/>
-              <a:t>24</a:t>
+              <a:t>23</a:t>
             </a:fld>
             <a:endParaRPr lang="pt-PT"/>
           </a:p>
@@ -28490,7 +28384,7 @@
 </p:sld>
 </file>
 
-<file path=ppt/slides/slide25.xml><?xml version="1.0" encoding="utf-8"?>
+<file path=ppt/slides/slide24.xml><?xml version="1.0" encoding="utf-8"?>
 <p:sld xmlns:a="http://schemas.openxmlformats.org/drawingml/2006/main" xmlns:r="http://schemas.openxmlformats.org/officeDocument/2006/relationships" xmlns:p="http://schemas.openxmlformats.org/presentationml/2006/main">
   <p:cSld>
     <p:spTree>
@@ -28564,7 +28458,7 @@
           <a:p>
             <a:fld id="{8BC8727B-4240-4963-929A-A961B0E9EF8D}" type="slidenum">
               <a:rPr lang="pt-PT" smtClean="0"/>
-              <a:t>25</a:t>
+              <a:t>24</a:t>
             </a:fld>
             <a:endParaRPr lang="pt-PT"/>
           </a:p>
@@ -30869,7 +30763,7 @@
 </p:sld>
 </file>
 
-<file path=ppt/slides/slide26.xml><?xml version="1.0" encoding="utf-8"?>
+<file path=ppt/slides/slide25.xml><?xml version="1.0" encoding="utf-8"?>
 <p:sld xmlns:a="http://schemas.openxmlformats.org/drawingml/2006/main" xmlns:r="http://schemas.openxmlformats.org/officeDocument/2006/relationships" xmlns:p="http://schemas.openxmlformats.org/presentationml/2006/main">
   <p:cSld>
     <p:spTree>
@@ -30951,7 +30845,7 @@
           <a:p>
             <a:fld id="{8BC8727B-4240-4963-929A-A961B0E9EF8D}" type="slidenum">
               <a:rPr lang="pt-PT" smtClean="0"/>
-              <a:t>26</a:t>
+              <a:t>25</a:t>
             </a:fld>
             <a:endParaRPr lang="pt-PT" dirty="0"/>
           </a:p>
@@ -33482,7 +33376,7 @@
         <p:spPr>
           <a:xfrm>
             <a:off x="620762" y="1233191"/>
-            <a:ext cx="2169968" cy="3400931"/>
+            <a:ext cx="2169968" cy="3031599"/>
           </a:xfrm>
           <a:prstGeom prst="rect">
             <a:avLst/>
@@ -33704,30 +33598,6 @@
                 <a:latin typeface="Archivo"/>
               </a:rPr>
               <a:t>Lecturer</a:t>
-            </a:r>
-          </a:p>
-          <a:p>
-            <a:pPr marL="284400" indent="-180000">
-              <a:buFont typeface="Arial" panose="020B0604020202020204" pitchFamily="34" charset="0"/>
-              <a:buChar char="•"/>
-            </a:pPr>
-            <a:r>
-              <a:rPr lang="en-US" sz="1200" dirty="0">
-                <a:latin typeface="Archivo"/>
-              </a:rPr>
-              <a:t>Period (day, timeslot)</a:t>
-            </a:r>
-          </a:p>
-          <a:p>
-            <a:pPr marL="284400" indent="-180000">
-              <a:buFont typeface="Arial" panose="020B0604020202020204" pitchFamily="34" charset="0"/>
-              <a:buChar char="•"/>
-            </a:pPr>
-            <a:r>
-              <a:rPr lang="en-US" sz="1200" dirty="0">
-                <a:latin typeface="Archivo"/>
-              </a:rPr>
-              <a:t>Room</a:t>
             </a:r>
           </a:p>
           <a:p>
@@ -33769,7 +33639,7 @@
         <p:spPr>
           <a:xfrm>
             <a:off x="3513436" y="1233191"/>
-            <a:ext cx="2117127" cy="2369880"/>
+            <a:ext cx="2117127" cy="2631490"/>
           </a:xfrm>
           <a:prstGeom prst="rect">
             <a:avLst/>
@@ -33879,7 +33749,7 @@
               <a:rPr lang="pt-PT" sz="1200" dirty="0" err="1">
                 <a:latin typeface="Archivo"/>
               </a:rPr>
-              <a:t>Availabilities</a:t>
+              <a:t>Unavailabilities</a:t>
             </a:r>
             <a:endParaRPr lang="pt-PT" sz="1200" dirty="0">
               <a:latin typeface="Archivo"/>
@@ -34002,7 +33872,37 @@
               </a:rPr>
               <a:t>Compactness</a:t>
             </a:r>
-            <a:endParaRPr lang="pt-PT" sz="1200" u="sng" dirty="0">
+            <a:endParaRPr lang="pt-PT" sz="1200" dirty="0">
+              <a:latin typeface="Archivo"/>
+            </a:endParaRPr>
+          </a:p>
+          <a:p>
+            <a:pPr marL="284400" indent="-180000">
+              <a:spcBef>
+                <a:spcPts val="600"/>
+              </a:spcBef>
+              <a:buFont typeface="Arial" panose="020B0604020202020204" pitchFamily="34" charset="0"/>
+              <a:buChar char="•"/>
+            </a:pPr>
+            <a:r>
+              <a:rPr lang="pt-PT" sz="1200" dirty="0" err="1">
+                <a:latin typeface="Archivo"/>
+              </a:rPr>
+              <a:t>Room</a:t>
+            </a:r>
+            <a:r>
+              <a:rPr lang="pt-PT" sz="1200" dirty="0">
+                <a:latin typeface="Archivo"/>
+              </a:rPr>
+              <a:t> </a:t>
+            </a:r>
+            <a:r>
+              <a:rPr lang="pt-PT" sz="1200" dirty="0" err="1">
+                <a:latin typeface="Archivo"/>
+              </a:rPr>
+              <a:t>Stability</a:t>
+            </a:r>
+            <a:endParaRPr lang="pt-PT" sz="1200" dirty="0">
               <a:latin typeface="Archivo"/>
             </a:endParaRPr>
           </a:p>

</xml_diff>

<commit_message>
update latex; update ppt
</commit_message>
<xml_diff>
--- a/Docs/Presentation.pptx
+++ b/Docs/Presentation.pptx
@@ -8344,11 +8344,7 @@
             </a:pPr>
             <a:r>
               <a:rPr lang="pt-PT" dirty="0"/>
-              <a:t>Em relação à implementação mais </a:t>
-            </a:r>
-            <a:r>
-              <a:rPr lang="pt-PT"/>
-              <a:t>em concreto…</a:t>
+              <a:t>Em relação à implementação mais em concreto…</a:t>
             </a:r>
           </a:p>
           <a:p>
@@ -9595,7 +9591,15 @@
             </a:pPr>
             <a:r>
               <a:rPr lang="pt-PT" dirty="0"/>
-              <a:t>Um caminho a seguir poderia ser este. Retirar as salas dos nós.</a:t>
+              <a:t>Um caminho a seguir </a:t>
+            </a:r>
+            <a:r>
+              <a:rPr lang="pt-PT"/>
+              <a:t>no futuro poderia </a:t>
+            </a:r>
+            <a:r>
+              <a:rPr lang="pt-PT" dirty="0"/>
+              <a:t>ser este. Retirar as salas dos nós.</a:t>
             </a:r>
           </a:p>
           <a:p>
@@ -13766,7 +13770,7 @@
         <p:spPr>
           <a:xfrm>
             <a:off x="2307600" y="3969347"/>
-            <a:ext cx="4528800" cy="475800"/>
+            <a:ext cx="4528800" cy="671058"/>
           </a:xfrm>
           <a:prstGeom prst="rect">
             <a:avLst/>
@@ -14006,7 +14010,6 @@
             </a:lvl9pPr>
           </a:lstStyle>
           <a:p>
-            <a:pPr algn="ctr"/>
             <a:r>
               <a:rPr lang="pt-PT" dirty="0">
                 <a:latin typeface="Libre Franklin" pitchFamily="2" charset="0"/>
@@ -14046,6 +14049,14 @@
                 <a:latin typeface="Libre Franklin" pitchFamily="2" charset="0"/>
               </a:rPr>
               <a:t> M:ERSI</a:t>
+            </a:r>
+          </a:p>
+          <a:p>
+            <a:r>
+              <a:rPr lang="pt-PT" dirty="0">
+                <a:latin typeface="Libre Franklin" pitchFamily="2" charset="0"/>
+              </a:rPr>
+              <a:t>Supervisor: João Pedro Pedroso</a:t>
             </a:r>
           </a:p>
         </p:txBody>

</xml_diff>